<commit_message>
Concise Implementation of Linear Regression
</commit_message>
<xml_diff>
--- a/Dive into Deep Learning/4. Concise Implementation of Linear Regression-EN.pptx
+++ b/Dive into Deep Learning/4. Concise Implementation of Linear Regression-EN.pptx
@@ -8938,8 +8938,8 @@
               <a:buSzPts val="1100"/>
             </a:pPr>
             <a:r>
-              <a:rPr lang="zh-CN" altLang="en-US" dirty="0"/>
-              <a:t>目录</a:t>
+              <a:rPr lang="en-US" dirty="0"/>
+              <a:t>Contents</a:t>
             </a:r>
             <a:endParaRPr dirty="0"/>
           </a:p>

</xml_diff>